<commit_message>
update L 4 and 5
</commit_message>
<xml_diff>
--- a/images and usefull code/images/New Microsoft PowerPoint Presentation.pptx
+++ b/images and usefull code/images/New Microsoft PowerPoint Presentation.pptx
@@ -274,7 +274,7 @@
           <a:p>
             <a:fld id="{1EDB1202-455D-4B50-888E-ABEE96FF032E}" type="datetimeFigureOut">
               <a:rPr lang="en-US" smtClean="0"/>
-              <a:t>9/9/2024</a:t>
+              <a:t>10/12/2024</a:t>
             </a:fld>
             <a:endParaRPr lang="en-US"/>
           </a:p>
@@ -474,7 +474,7 @@
           <a:p>
             <a:fld id="{1EDB1202-455D-4B50-888E-ABEE96FF032E}" type="datetimeFigureOut">
               <a:rPr lang="en-US" smtClean="0"/>
-              <a:t>9/9/2024</a:t>
+              <a:t>10/12/2024</a:t>
             </a:fld>
             <a:endParaRPr lang="en-US"/>
           </a:p>
@@ -684,7 +684,7 @@
           <a:p>
             <a:fld id="{1EDB1202-455D-4B50-888E-ABEE96FF032E}" type="datetimeFigureOut">
               <a:rPr lang="en-US" smtClean="0"/>
-              <a:t>9/9/2024</a:t>
+              <a:t>10/12/2024</a:t>
             </a:fld>
             <a:endParaRPr lang="en-US"/>
           </a:p>
@@ -884,7 +884,7 @@
           <a:p>
             <a:fld id="{1EDB1202-455D-4B50-888E-ABEE96FF032E}" type="datetimeFigureOut">
               <a:rPr lang="en-US" smtClean="0"/>
-              <a:t>9/9/2024</a:t>
+              <a:t>10/12/2024</a:t>
             </a:fld>
             <a:endParaRPr lang="en-US"/>
           </a:p>
@@ -1160,7 +1160,7 @@
           <a:p>
             <a:fld id="{1EDB1202-455D-4B50-888E-ABEE96FF032E}" type="datetimeFigureOut">
               <a:rPr lang="en-US" smtClean="0"/>
-              <a:t>9/9/2024</a:t>
+              <a:t>10/12/2024</a:t>
             </a:fld>
             <a:endParaRPr lang="en-US"/>
           </a:p>
@@ -1428,7 +1428,7 @@
           <a:p>
             <a:fld id="{1EDB1202-455D-4B50-888E-ABEE96FF032E}" type="datetimeFigureOut">
               <a:rPr lang="en-US" smtClean="0"/>
-              <a:t>9/9/2024</a:t>
+              <a:t>10/12/2024</a:t>
             </a:fld>
             <a:endParaRPr lang="en-US"/>
           </a:p>
@@ -1843,7 +1843,7 @@
           <a:p>
             <a:fld id="{1EDB1202-455D-4B50-888E-ABEE96FF032E}" type="datetimeFigureOut">
               <a:rPr lang="en-US" smtClean="0"/>
-              <a:t>9/9/2024</a:t>
+              <a:t>10/12/2024</a:t>
             </a:fld>
             <a:endParaRPr lang="en-US"/>
           </a:p>
@@ -1985,7 +1985,7 @@
           <a:p>
             <a:fld id="{1EDB1202-455D-4B50-888E-ABEE96FF032E}" type="datetimeFigureOut">
               <a:rPr lang="en-US" smtClean="0"/>
-              <a:t>9/9/2024</a:t>
+              <a:t>10/12/2024</a:t>
             </a:fld>
             <a:endParaRPr lang="en-US"/>
           </a:p>
@@ -2098,7 +2098,7 @@
           <a:p>
             <a:fld id="{1EDB1202-455D-4B50-888E-ABEE96FF032E}" type="datetimeFigureOut">
               <a:rPr lang="en-US" smtClean="0"/>
-              <a:t>9/9/2024</a:t>
+              <a:t>10/12/2024</a:t>
             </a:fld>
             <a:endParaRPr lang="en-US"/>
           </a:p>
@@ -2411,7 +2411,7 @@
           <a:p>
             <a:fld id="{1EDB1202-455D-4B50-888E-ABEE96FF032E}" type="datetimeFigureOut">
               <a:rPr lang="en-US" smtClean="0"/>
-              <a:t>9/9/2024</a:t>
+              <a:t>10/12/2024</a:t>
             </a:fld>
             <a:endParaRPr lang="en-US"/>
           </a:p>
@@ -2700,7 +2700,7 @@
           <a:p>
             <a:fld id="{1EDB1202-455D-4B50-888E-ABEE96FF032E}" type="datetimeFigureOut">
               <a:rPr lang="en-US" smtClean="0"/>
-              <a:t>9/9/2024</a:t>
+              <a:t>10/12/2024</a:t>
             </a:fld>
             <a:endParaRPr lang="en-US"/>
           </a:p>
@@ -2943,7 +2943,7 @@
           <a:p>
             <a:fld id="{1EDB1202-455D-4B50-888E-ABEE96FF032E}" type="datetimeFigureOut">
               <a:rPr lang="en-US" smtClean="0"/>
-              <a:t>9/9/2024</a:t>
+              <a:t>10/12/2024</a:t>
             </a:fld>
             <a:endParaRPr lang="en-US"/>
           </a:p>
@@ -7069,7 +7069,7 @@
           <p:nvPr>
             <p:extLst>
               <p:ext uri="{D42A27DB-BD31-4B8C-83A1-F6EECF244321}">
-                <p14:modId xmlns:p14="http://schemas.microsoft.com/office/powerpoint/2010/main" val="1461499137"/>
+                <p14:modId xmlns:p14="http://schemas.microsoft.com/office/powerpoint/2010/main" val="3553799946"/>
               </p:ext>
             </p:extLst>
           </p:nvPr>
@@ -7492,9 +7492,7 @@
                   </a:txBody>
                   <a:tcPr anchor="ctr">
                     <a:solidFill>
-                      <a:schemeClr val="bg1">
-                        <a:lumMod val="85000"/>
-                      </a:schemeClr>
+                      <a:schemeClr val="bg1"/>
                     </a:solidFill>
                   </a:tcPr>
                 </a:tc>
@@ -7561,7 +7559,7 @@
           <p:nvPr>
             <p:extLst>
               <p:ext uri="{D42A27DB-BD31-4B8C-83A1-F6EECF244321}">
-                <p14:modId xmlns:p14="http://schemas.microsoft.com/office/powerpoint/2010/main" val="1677964615"/>
+                <p14:modId xmlns:p14="http://schemas.microsoft.com/office/powerpoint/2010/main" val="2686716360"/>
               </p:ext>
             </p:extLst>
           </p:nvPr>
@@ -7714,9 +7712,7 @@
                   </a:txBody>
                   <a:tcPr anchor="ctr">
                     <a:solidFill>
-                      <a:schemeClr val="bg1">
-                        <a:lumMod val="85000"/>
-                      </a:schemeClr>
+                      <a:schemeClr val="bg1"/>
                     </a:solidFill>
                   </a:tcPr>
                 </a:tc>
@@ -7731,9 +7727,7 @@
                   </a:txBody>
                   <a:tcPr anchor="ctr">
                     <a:solidFill>
-                      <a:schemeClr val="bg1">
-                        <a:lumMod val="85000"/>
-                      </a:schemeClr>
+                      <a:schemeClr val="bg1"/>
                     </a:solidFill>
                   </a:tcPr>
                 </a:tc>
@@ -8062,7 +8056,7 @@
           <p:nvPr>
             <p:extLst>
               <p:ext uri="{D42A27DB-BD31-4B8C-83A1-F6EECF244321}">
-                <p14:modId xmlns:p14="http://schemas.microsoft.com/office/powerpoint/2010/main" val="241632670"/>
+                <p14:modId xmlns:p14="http://schemas.microsoft.com/office/powerpoint/2010/main" val="2352570315"/>
               </p:ext>
             </p:extLst>
           </p:nvPr>
@@ -8485,9 +8479,7 @@
                   </a:txBody>
                   <a:tcPr anchor="ctr">
                     <a:solidFill>
-                      <a:schemeClr val="bg1">
-                        <a:lumMod val="85000"/>
-                      </a:schemeClr>
+                      <a:schemeClr val="bg1"/>
                     </a:solidFill>
                   </a:tcPr>
                 </a:tc>
@@ -8527,9 +8519,7 @@
                   </a:txBody>
                   <a:tcPr anchor="ctr">
                     <a:solidFill>
-                      <a:schemeClr val="bg1">
-                        <a:lumMod val="85000"/>
-                      </a:schemeClr>
+                      <a:schemeClr val="bg1"/>
                     </a:solidFill>
                   </a:tcPr>
                 </a:tc>

</xml_diff>